<commit_message>
something for teh review
</commit_message>
<xml_diff>
--- a/reports/MutationTestingSurvey/images/DataDrivenSimpleExample.pptx
+++ b/reports/MutationTestingSurvey/images/DataDrivenSimpleExample.pptx
@@ -6,6 +6,7 @@
   </p:sldMasterIdLst>
   <p:sldIdLst>
     <p:sldId id="256" r:id="rId2"/>
+    <p:sldId id="257" r:id="rId3"/>
   </p:sldIdLst>
   <p:sldSz cx="5400675" cy="2160588"/>
   <p:notesSz cx="6858000" cy="9144000"/>
@@ -104,6 +105,11 @@
       </a:defRPr>
     </a:lvl9pPr>
   </p:defaultTextStyle>
+  <p:extLst>
+    <p:ext uri="{EFAFB233-063F-42B5-8137-9DF3F51BA10A}">
+      <p15:sldGuideLst xmlns:p15="http://schemas.microsoft.com/office/powerpoint/2012/main"/>
+    </p:ext>
+  </p:extLst>
 </p:presentation>
 </file>
 
@@ -238,7 +244,7 @@
           <a:p>
             <a:fld id="{BA168229-D0A0-5B42-96C0-7FB20CA164FC}" type="datetimeFigureOut">
               <a:rPr lang="en-US" smtClean="0"/>
-              <a:t>3/22/20</a:t>
+              <a:t>4/6/20</a:t>
             </a:fld>
             <a:endParaRPr lang="en-US"/>
           </a:p>
@@ -408,7 +414,7 @@
           <a:p>
             <a:fld id="{BA168229-D0A0-5B42-96C0-7FB20CA164FC}" type="datetimeFigureOut">
               <a:rPr lang="en-US" smtClean="0"/>
-              <a:t>3/22/20</a:t>
+              <a:t>4/6/20</a:t>
             </a:fld>
             <a:endParaRPr lang="en-US"/>
           </a:p>
@@ -588,7 +594,7 @@
           <a:p>
             <a:fld id="{BA168229-D0A0-5B42-96C0-7FB20CA164FC}" type="datetimeFigureOut">
               <a:rPr lang="en-US" smtClean="0"/>
-              <a:t>3/22/20</a:t>
+              <a:t>4/6/20</a:t>
             </a:fld>
             <a:endParaRPr lang="en-US"/>
           </a:p>
@@ -758,7 +764,7 @@
           <a:p>
             <a:fld id="{BA168229-D0A0-5B42-96C0-7FB20CA164FC}" type="datetimeFigureOut">
               <a:rPr lang="en-US" smtClean="0"/>
-              <a:t>3/22/20</a:t>
+              <a:t>4/6/20</a:t>
             </a:fld>
             <a:endParaRPr lang="en-US"/>
           </a:p>
@@ -1004,7 +1010,7 @@
           <a:p>
             <a:fld id="{BA168229-D0A0-5B42-96C0-7FB20CA164FC}" type="datetimeFigureOut">
               <a:rPr lang="en-US" smtClean="0"/>
-              <a:t>3/22/20</a:t>
+              <a:t>4/6/20</a:t>
             </a:fld>
             <a:endParaRPr lang="en-US"/>
           </a:p>
@@ -1236,7 +1242,7 @@
           <a:p>
             <a:fld id="{BA168229-D0A0-5B42-96C0-7FB20CA164FC}" type="datetimeFigureOut">
               <a:rPr lang="en-US" smtClean="0"/>
-              <a:t>3/22/20</a:t>
+              <a:t>4/6/20</a:t>
             </a:fld>
             <a:endParaRPr lang="en-US"/>
           </a:p>
@@ -1603,7 +1609,7 @@
           <a:p>
             <a:fld id="{BA168229-D0A0-5B42-96C0-7FB20CA164FC}" type="datetimeFigureOut">
               <a:rPr lang="en-US" smtClean="0"/>
-              <a:t>3/22/20</a:t>
+              <a:t>4/6/20</a:t>
             </a:fld>
             <a:endParaRPr lang="en-US"/>
           </a:p>
@@ -1721,7 +1727,7 @@
           <a:p>
             <a:fld id="{BA168229-D0A0-5B42-96C0-7FB20CA164FC}" type="datetimeFigureOut">
               <a:rPr lang="en-US" smtClean="0"/>
-              <a:t>3/22/20</a:t>
+              <a:t>4/6/20</a:t>
             </a:fld>
             <a:endParaRPr lang="en-US"/>
           </a:p>
@@ -1816,7 +1822,7 @@
           <a:p>
             <a:fld id="{BA168229-D0A0-5B42-96C0-7FB20CA164FC}" type="datetimeFigureOut">
               <a:rPr lang="en-US" smtClean="0"/>
-              <a:t>3/22/20</a:t>
+              <a:t>4/6/20</a:t>
             </a:fld>
             <a:endParaRPr lang="en-US"/>
           </a:p>
@@ -2093,7 +2099,7 @@
           <a:p>
             <a:fld id="{BA168229-D0A0-5B42-96C0-7FB20CA164FC}" type="datetimeFigureOut">
               <a:rPr lang="en-US" smtClean="0"/>
-              <a:t>3/22/20</a:t>
+              <a:t>4/6/20</a:t>
             </a:fld>
             <a:endParaRPr lang="en-US"/>
           </a:p>
@@ -2350,7 +2356,7 @@
           <a:p>
             <a:fld id="{BA168229-D0A0-5B42-96C0-7FB20CA164FC}" type="datetimeFigureOut">
               <a:rPr lang="en-US" smtClean="0"/>
-              <a:t>3/22/20</a:t>
+              <a:t>4/6/20</a:t>
             </a:fld>
             <a:endParaRPr lang="en-US"/>
           </a:p>
@@ -2563,7 +2569,7 @@
           <a:p>
             <a:fld id="{BA168229-D0A0-5B42-96C0-7FB20CA164FC}" type="datetimeFigureOut">
               <a:rPr lang="en-US" smtClean="0"/>
-              <a:t>3/22/20</a:t>
+              <a:t>4/6/20</a:t>
             </a:fld>
             <a:endParaRPr lang="en-US"/>
           </a:p>
@@ -4584,6 +4590,1639 @@
 </p:sld>
 </file>
 
+<file path=ppt/slides/slide2.xml><?xml version="1.0" encoding="utf-8"?>
+<p:sld xmlns:a="http://schemas.openxmlformats.org/drawingml/2006/main" xmlns:r="http://schemas.openxmlformats.org/officeDocument/2006/relationships" xmlns:p="http://schemas.openxmlformats.org/presentationml/2006/main">
+  <p:cSld>
+    <p:spTree>
+      <p:nvGrpSpPr>
+        <p:cNvPr id="1" name=""/>
+        <p:cNvGrpSpPr/>
+        <p:nvPr/>
+      </p:nvGrpSpPr>
+      <p:grpSpPr>
+        <a:xfrm>
+          <a:off x="0" y="0"/>
+          <a:ext cx="0" cy="0"/>
+          <a:chOff x="0" y="0"/>
+          <a:chExt cx="0" cy="0"/>
+        </a:xfrm>
+      </p:grpSpPr>
+      <p:sp>
+        <p:nvSpPr>
+          <p:cNvPr id="37" name="Rectangle 36">
+            <a:extLst>
+              <a:ext uri="{FF2B5EF4-FFF2-40B4-BE49-F238E27FC236}">
+                <a16:creationId xmlns:a16="http://schemas.microsoft.com/office/drawing/2014/main" id="{6D6E3FA5-D882-084B-8875-F745F4A2BDEE}"/>
+              </a:ext>
+            </a:extLst>
+          </p:cNvPr>
+          <p:cNvSpPr/>
+          <p:nvPr/>
+        </p:nvSpPr>
+        <p:spPr>
+          <a:xfrm>
+            <a:off x="2373116" y="94090"/>
+            <a:ext cx="794802" cy="295233"/>
+          </a:xfrm>
+          <a:prstGeom prst="rect">
+            <a:avLst/>
+          </a:prstGeom>
+          <a:noFill/>
+          <a:ln>
+            <a:solidFill>
+              <a:schemeClr val="tx1"/>
+            </a:solidFill>
+          </a:ln>
+        </p:spPr>
+        <p:style>
+          <a:lnRef idx="2">
+            <a:schemeClr val="accent1">
+              <a:shade val="50000"/>
+            </a:schemeClr>
+          </a:lnRef>
+          <a:fillRef idx="1">
+            <a:schemeClr val="accent1"/>
+          </a:fillRef>
+          <a:effectRef idx="0">
+            <a:schemeClr val="accent1"/>
+          </a:effectRef>
+          <a:fontRef idx="minor">
+            <a:schemeClr val="lt1"/>
+          </a:fontRef>
+        </p:style>
+        <p:txBody>
+          <a:bodyPr rtlCol="0" anchor="ctr"/>
+          <a:lstStyle/>
+          <a:p>
+            <a:pPr algn="ctr"/>
+            <a:endParaRPr lang="en-US"/>
+          </a:p>
+        </p:txBody>
+      </p:sp>
+      <p:sp>
+        <p:nvSpPr>
+          <p:cNvPr id="38" name="Rectangle 37">
+            <a:extLst>
+              <a:ext uri="{FF2B5EF4-FFF2-40B4-BE49-F238E27FC236}">
+                <a16:creationId xmlns:a16="http://schemas.microsoft.com/office/drawing/2014/main" id="{AB944302-1B02-B643-A53F-AC1244D2DA55}"/>
+              </a:ext>
+            </a:extLst>
+          </p:cNvPr>
+          <p:cNvSpPr/>
+          <p:nvPr/>
+        </p:nvSpPr>
+        <p:spPr>
+          <a:xfrm>
+            <a:off x="2373800" y="94773"/>
+            <a:ext cx="794802" cy="134632"/>
+          </a:xfrm>
+          <a:prstGeom prst="rect">
+            <a:avLst/>
+          </a:prstGeom>
+          <a:noFill/>
+          <a:ln>
+            <a:solidFill>
+              <a:schemeClr val="tx1"/>
+            </a:solidFill>
+          </a:ln>
+        </p:spPr>
+        <p:style>
+          <a:lnRef idx="2">
+            <a:schemeClr val="accent1">
+              <a:shade val="50000"/>
+            </a:schemeClr>
+          </a:lnRef>
+          <a:fillRef idx="1">
+            <a:schemeClr val="accent1"/>
+          </a:fillRef>
+          <a:effectRef idx="0">
+            <a:schemeClr val="accent1"/>
+          </a:effectRef>
+          <a:fontRef idx="minor">
+            <a:schemeClr val="lt1"/>
+          </a:fontRef>
+        </p:style>
+        <p:txBody>
+          <a:bodyPr rtlCol="0" anchor="ctr"/>
+          <a:lstStyle/>
+          <a:p>
+            <a:pPr algn="ctr"/>
+            <a:r>
+              <a:rPr lang="en-US" sz="800" i="1" dirty="0">
+                <a:solidFill>
+                  <a:schemeClr val="tx1"/>
+                </a:solidFill>
+              </a:rPr>
+              <a:t>Message</a:t>
+            </a:r>
+          </a:p>
+        </p:txBody>
+      </p:sp>
+      <p:sp>
+        <p:nvSpPr>
+          <p:cNvPr id="39" name="Rectangle 38">
+            <a:extLst>
+              <a:ext uri="{FF2B5EF4-FFF2-40B4-BE49-F238E27FC236}">
+                <a16:creationId xmlns:a16="http://schemas.microsoft.com/office/drawing/2014/main" id="{C85964B2-A1E3-1643-B677-3B6741E0CB42}"/>
+              </a:ext>
+            </a:extLst>
+          </p:cNvPr>
+          <p:cNvSpPr/>
+          <p:nvPr/>
+        </p:nvSpPr>
+        <p:spPr>
+          <a:xfrm>
+            <a:off x="1799737" y="574526"/>
+            <a:ext cx="905514" cy="295233"/>
+          </a:xfrm>
+          <a:prstGeom prst="rect">
+            <a:avLst/>
+          </a:prstGeom>
+          <a:noFill/>
+          <a:ln>
+            <a:solidFill>
+              <a:schemeClr val="tx1"/>
+            </a:solidFill>
+          </a:ln>
+        </p:spPr>
+        <p:style>
+          <a:lnRef idx="2">
+            <a:schemeClr val="accent1">
+              <a:shade val="50000"/>
+            </a:schemeClr>
+          </a:lnRef>
+          <a:fillRef idx="1">
+            <a:schemeClr val="accent1"/>
+          </a:fillRef>
+          <a:effectRef idx="0">
+            <a:schemeClr val="accent1"/>
+          </a:effectRef>
+          <a:fontRef idx="minor">
+            <a:schemeClr val="lt1"/>
+          </a:fontRef>
+        </p:style>
+        <p:txBody>
+          <a:bodyPr rtlCol="0" anchor="ctr"/>
+          <a:lstStyle/>
+          <a:p>
+            <a:pPr algn="ctr"/>
+            <a:endParaRPr lang="en-US"/>
+          </a:p>
+        </p:txBody>
+      </p:sp>
+      <p:sp>
+        <p:nvSpPr>
+          <p:cNvPr id="40" name="Rectangle 39">
+            <a:extLst>
+              <a:ext uri="{FF2B5EF4-FFF2-40B4-BE49-F238E27FC236}">
+                <a16:creationId xmlns:a16="http://schemas.microsoft.com/office/drawing/2014/main" id="{FFBA812B-4E14-034C-9B8B-4E16398A9D5C}"/>
+              </a:ext>
+            </a:extLst>
+          </p:cNvPr>
+          <p:cNvSpPr/>
+          <p:nvPr/>
+        </p:nvSpPr>
+        <p:spPr>
+          <a:xfrm>
+            <a:off x="1800421" y="575209"/>
+            <a:ext cx="904830" cy="134632"/>
+          </a:xfrm>
+          <a:prstGeom prst="rect">
+            <a:avLst/>
+          </a:prstGeom>
+          <a:noFill/>
+          <a:ln>
+            <a:solidFill>
+              <a:schemeClr val="tx1"/>
+            </a:solidFill>
+          </a:ln>
+        </p:spPr>
+        <p:style>
+          <a:lnRef idx="2">
+            <a:schemeClr val="accent1">
+              <a:shade val="50000"/>
+            </a:schemeClr>
+          </a:lnRef>
+          <a:fillRef idx="1">
+            <a:schemeClr val="accent1"/>
+          </a:fillRef>
+          <a:effectRef idx="0">
+            <a:schemeClr val="accent1"/>
+          </a:effectRef>
+          <a:fontRef idx="minor">
+            <a:schemeClr val="lt1"/>
+          </a:fontRef>
+        </p:style>
+        <p:txBody>
+          <a:bodyPr rtlCol="0" anchor="ctr"/>
+          <a:lstStyle/>
+          <a:p>
+            <a:pPr algn="ctr"/>
+            <a:r>
+              <a:rPr lang="en-US" sz="800" dirty="0" err="1">
+                <a:solidFill>
+                  <a:schemeClr val="tx1"/>
+                </a:solidFill>
+              </a:rPr>
+              <a:t>TimeMessage</a:t>
+            </a:r>
+            <a:endParaRPr lang="en-US" sz="800" dirty="0">
+              <a:solidFill>
+                <a:schemeClr val="tx1"/>
+              </a:solidFill>
+            </a:endParaRPr>
+          </a:p>
+        </p:txBody>
+      </p:sp>
+      <p:sp>
+        <p:nvSpPr>
+          <p:cNvPr id="41" name="TextBox 40">
+            <a:extLst>
+              <a:ext uri="{FF2B5EF4-FFF2-40B4-BE49-F238E27FC236}">
+                <a16:creationId xmlns:a16="http://schemas.microsoft.com/office/drawing/2014/main" id="{27664F17-1404-0B46-8E9D-1B83E31606AA}"/>
+              </a:ext>
+            </a:extLst>
+          </p:cNvPr>
+          <p:cNvSpPr txBox="1"/>
+          <p:nvPr/>
+        </p:nvSpPr>
+        <p:spPr>
+          <a:xfrm>
+            <a:off x="1741646" y="696855"/>
+            <a:ext cx="646331" cy="170816"/>
+          </a:xfrm>
+          <a:prstGeom prst="rect">
+            <a:avLst/>
+          </a:prstGeom>
+          <a:noFill/>
+        </p:spPr>
+        <p:txBody>
+          <a:bodyPr wrap="none" rtlCol="0">
+            <a:spAutoFit/>
+          </a:bodyPr>
+          <a:lstStyle/>
+          <a:p>
+            <a:r>
+              <a:rPr lang="en-US" dirty="0"/>
+              <a:t>timestamp : Long</a:t>
+            </a:r>
+          </a:p>
+        </p:txBody>
+      </p:sp>
+      <p:sp>
+        <p:nvSpPr>
+          <p:cNvPr id="42" name="Rectangle 41">
+            <a:extLst>
+              <a:ext uri="{FF2B5EF4-FFF2-40B4-BE49-F238E27FC236}">
+                <a16:creationId xmlns:a16="http://schemas.microsoft.com/office/drawing/2014/main" id="{1AF987A9-3DEE-FB48-B193-03BCD348E797}"/>
+              </a:ext>
+            </a:extLst>
+          </p:cNvPr>
+          <p:cNvSpPr/>
+          <p:nvPr/>
+        </p:nvSpPr>
+        <p:spPr>
+          <a:xfrm>
+            <a:off x="2821432" y="571108"/>
+            <a:ext cx="905514" cy="423973"/>
+          </a:xfrm>
+          <a:prstGeom prst="rect">
+            <a:avLst/>
+          </a:prstGeom>
+          <a:noFill/>
+          <a:ln>
+            <a:solidFill>
+              <a:schemeClr val="tx1"/>
+            </a:solidFill>
+          </a:ln>
+        </p:spPr>
+        <p:style>
+          <a:lnRef idx="2">
+            <a:schemeClr val="accent1">
+              <a:shade val="50000"/>
+            </a:schemeClr>
+          </a:lnRef>
+          <a:fillRef idx="1">
+            <a:schemeClr val="accent1"/>
+          </a:fillRef>
+          <a:effectRef idx="0">
+            <a:schemeClr val="accent1"/>
+          </a:effectRef>
+          <a:fontRef idx="minor">
+            <a:schemeClr val="lt1"/>
+          </a:fontRef>
+        </p:style>
+        <p:txBody>
+          <a:bodyPr rtlCol="0" anchor="ctr"/>
+          <a:lstStyle/>
+          <a:p>
+            <a:pPr algn="ctr"/>
+            <a:endParaRPr lang="en-US"/>
+          </a:p>
+        </p:txBody>
+      </p:sp>
+      <p:sp>
+        <p:nvSpPr>
+          <p:cNvPr id="43" name="Rectangle 42">
+            <a:extLst>
+              <a:ext uri="{FF2B5EF4-FFF2-40B4-BE49-F238E27FC236}">
+                <a16:creationId xmlns:a16="http://schemas.microsoft.com/office/drawing/2014/main" id="{EACA4960-3981-684F-8B1B-35827960D434}"/>
+              </a:ext>
+            </a:extLst>
+          </p:cNvPr>
+          <p:cNvSpPr/>
+          <p:nvPr/>
+        </p:nvSpPr>
+        <p:spPr>
+          <a:xfrm>
+            <a:off x="2822116" y="571792"/>
+            <a:ext cx="904830" cy="134632"/>
+          </a:xfrm>
+          <a:prstGeom prst="rect">
+            <a:avLst/>
+          </a:prstGeom>
+          <a:noFill/>
+          <a:ln>
+            <a:solidFill>
+              <a:schemeClr val="tx1"/>
+            </a:solidFill>
+          </a:ln>
+        </p:spPr>
+        <p:style>
+          <a:lnRef idx="2">
+            <a:schemeClr val="accent1">
+              <a:shade val="50000"/>
+            </a:schemeClr>
+          </a:lnRef>
+          <a:fillRef idx="1">
+            <a:schemeClr val="accent1"/>
+          </a:fillRef>
+          <a:effectRef idx="0">
+            <a:schemeClr val="accent1"/>
+          </a:effectRef>
+          <a:fontRef idx="minor">
+            <a:schemeClr val="lt1"/>
+          </a:fontRef>
+        </p:style>
+        <p:txBody>
+          <a:bodyPr rtlCol="0" anchor="ctr"/>
+          <a:lstStyle/>
+          <a:p>
+            <a:pPr algn="ctr"/>
+            <a:r>
+              <a:rPr lang="en-US" sz="800" dirty="0" err="1">
+                <a:solidFill>
+                  <a:schemeClr val="tx1"/>
+                </a:solidFill>
+              </a:rPr>
+              <a:t>DataMessage</a:t>
+            </a:r>
+            <a:endParaRPr lang="en-US" sz="800" dirty="0">
+              <a:solidFill>
+                <a:schemeClr val="tx1"/>
+              </a:solidFill>
+            </a:endParaRPr>
+          </a:p>
+        </p:txBody>
+      </p:sp>
+      <p:sp>
+        <p:nvSpPr>
+          <p:cNvPr id="44" name="TextBox 43">
+            <a:extLst>
+              <a:ext uri="{FF2B5EF4-FFF2-40B4-BE49-F238E27FC236}">
+                <a16:creationId xmlns:a16="http://schemas.microsoft.com/office/drawing/2014/main" id="{EE746CE1-8D1B-7045-8544-57F9A112A6FC}"/>
+              </a:ext>
+            </a:extLst>
+          </p:cNvPr>
+          <p:cNvSpPr txBox="1"/>
+          <p:nvPr/>
+        </p:nvSpPr>
+        <p:spPr>
+          <a:xfrm>
+            <a:off x="2763341" y="693438"/>
+            <a:ext cx="601447" cy="249299"/>
+          </a:xfrm>
+          <a:prstGeom prst="rect">
+            <a:avLst/>
+          </a:prstGeom>
+          <a:noFill/>
+        </p:spPr>
+        <p:txBody>
+          <a:bodyPr wrap="none" rtlCol="0">
+            <a:spAutoFit/>
+          </a:bodyPr>
+          <a:lstStyle/>
+          <a:p>
+            <a:r>
+              <a:rPr lang="en-US" dirty="0"/>
+              <a:t>size : Integer</a:t>
+            </a:r>
+          </a:p>
+          <a:p>
+            <a:r>
+              <a:rPr lang="en-US" dirty="0"/>
+              <a:t>payload : Byte[]</a:t>
+            </a:r>
+          </a:p>
+        </p:txBody>
+      </p:sp>
+      <p:cxnSp>
+        <p:nvCxnSpPr>
+          <p:cNvPr id="45" name="Elbow Connector 44">
+            <a:extLst>
+              <a:ext uri="{FF2B5EF4-FFF2-40B4-BE49-F238E27FC236}">
+                <a16:creationId xmlns:a16="http://schemas.microsoft.com/office/drawing/2014/main" id="{68A7F629-0289-9045-A2B7-7763B3284BDE}"/>
+              </a:ext>
+            </a:extLst>
+          </p:cNvPr>
+          <p:cNvCxnSpPr>
+            <a:cxnSpLocks/>
+            <a:stCxn id="43" idx="0"/>
+            <a:endCxn id="37" idx="2"/>
+          </p:cNvCxnSpPr>
+          <p:nvPr/>
+        </p:nvCxnSpPr>
+        <p:spPr>
+          <a:xfrm rot="16200000" flipV="1">
+            <a:off x="2931290" y="228551"/>
+            <a:ext cx="182469" cy="504014"/>
+          </a:xfrm>
+          <a:prstGeom prst="bentConnector3">
+            <a:avLst>
+              <a:gd name="adj1" fmla="val 50000"/>
+            </a:avLst>
+          </a:prstGeom>
+          <a:ln>
+            <a:solidFill>
+              <a:schemeClr val="tx1"/>
+            </a:solidFill>
+            <a:tailEnd type="triangle"/>
+          </a:ln>
+        </p:spPr>
+        <p:style>
+          <a:lnRef idx="1">
+            <a:schemeClr val="accent1"/>
+          </a:lnRef>
+          <a:fillRef idx="0">
+            <a:schemeClr val="accent1"/>
+          </a:fillRef>
+          <a:effectRef idx="0">
+            <a:schemeClr val="accent1"/>
+          </a:effectRef>
+          <a:fontRef idx="minor">
+            <a:schemeClr val="tx1"/>
+          </a:fontRef>
+        </p:style>
+      </p:cxnSp>
+      <p:cxnSp>
+        <p:nvCxnSpPr>
+          <p:cNvPr id="46" name="Elbow Connector 45">
+            <a:extLst>
+              <a:ext uri="{FF2B5EF4-FFF2-40B4-BE49-F238E27FC236}">
+                <a16:creationId xmlns:a16="http://schemas.microsoft.com/office/drawing/2014/main" id="{FB99FAED-D14A-DA42-A15D-0BB295E9E46C}"/>
+              </a:ext>
+            </a:extLst>
+          </p:cNvPr>
+          <p:cNvCxnSpPr>
+            <a:cxnSpLocks/>
+            <a:stCxn id="40" idx="0"/>
+            <a:endCxn id="37" idx="2"/>
+          </p:cNvCxnSpPr>
+          <p:nvPr/>
+        </p:nvCxnSpPr>
+        <p:spPr>
+          <a:xfrm rot="5400000" flipH="1" flipV="1">
+            <a:off x="2418733" y="223426"/>
+            <a:ext cx="185886" cy="517681"/>
+          </a:xfrm>
+          <a:prstGeom prst="bentConnector3">
+            <a:avLst>
+              <a:gd name="adj1" fmla="val 50000"/>
+            </a:avLst>
+          </a:prstGeom>
+          <a:ln>
+            <a:solidFill>
+              <a:schemeClr val="tx1"/>
+            </a:solidFill>
+            <a:tailEnd type="triangle"/>
+          </a:ln>
+        </p:spPr>
+        <p:style>
+          <a:lnRef idx="1">
+            <a:schemeClr val="accent1"/>
+          </a:lnRef>
+          <a:fillRef idx="0">
+            <a:schemeClr val="accent1"/>
+          </a:fillRef>
+          <a:effectRef idx="0">
+            <a:schemeClr val="accent1"/>
+          </a:effectRef>
+          <a:fontRef idx="minor">
+            <a:schemeClr val="tx1"/>
+          </a:fontRef>
+        </p:style>
+      </p:cxnSp>
+      <p:sp>
+        <p:nvSpPr>
+          <p:cNvPr id="47" name="Rectangle 46">
+            <a:extLst>
+              <a:ext uri="{FF2B5EF4-FFF2-40B4-BE49-F238E27FC236}">
+                <a16:creationId xmlns:a16="http://schemas.microsoft.com/office/drawing/2014/main" id="{CEF26FFB-E257-A343-A0CF-57FE4A6A81B6}"/>
+              </a:ext>
+            </a:extLst>
+          </p:cNvPr>
+          <p:cNvSpPr/>
+          <p:nvPr/>
+        </p:nvSpPr>
+        <p:spPr>
+          <a:xfrm>
+            <a:off x="884418" y="1227401"/>
+            <a:ext cx="978000" cy="295233"/>
+          </a:xfrm>
+          <a:prstGeom prst="rect">
+            <a:avLst/>
+          </a:prstGeom>
+          <a:noFill/>
+          <a:ln>
+            <a:solidFill>
+              <a:schemeClr val="tx1"/>
+            </a:solidFill>
+          </a:ln>
+        </p:spPr>
+        <p:style>
+          <a:lnRef idx="2">
+            <a:schemeClr val="accent1">
+              <a:shade val="50000"/>
+            </a:schemeClr>
+          </a:lnRef>
+          <a:fillRef idx="1">
+            <a:schemeClr val="accent1"/>
+          </a:fillRef>
+          <a:effectRef idx="0">
+            <a:schemeClr val="accent1"/>
+          </a:effectRef>
+          <a:fontRef idx="minor">
+            <a:schemeClr val="lt1"/>
+          </a:fontRef>
+        </p:style>
+        <p:txBody>
+          <a:bodyPr rtlCol="0" anchor="ctr"/>
+          <a:lstStyle/>
+          <a:p>
+            <a:pPr algn="ctr"/>
+            <a:endParaRPr lang="en-US"/>
+          </a:p>
+        </p:txBody>
+      </p:sp>
+      <p:sp>
+        <p:nvSpPr>
+          <p:cNvPr id="48" name="Rectangle 47">
+            <a:extLst>
+              <a:ext uri="{FF2B5EF4-FFF2-40B4-BE49-F238E27FC236}">
+                <a16:creationId xmlns:a16="http://schemas.microsoft.com/office/drawing/2014/main" id="{B387A221-2318-E549-AAD5-EB8626F35997}"/>
+              </a:ext>
+            </a:extLst>
+          </p:cNvPr>
+          <p:cNvSpPr/>
+          <p:nvPr/>
+        </p:nvSpPr>
+        <p:spPr>
+          <a:xfrm>
+            <a:off x="885102" y="1228084"/>
+            <a:ext cx="977316" cy="136792"/>
+          </a:xfrm>
+          <a:prstGeom prst="rect">
+            <a:avLst/>
+          </a:prstGeom>
+          <a:noFill/>
+          <a:ln>
+            <a:solidFill>
+              <a:schemeClr val="tx1"/>
+            </a:solidFill>
+          </a:ln>
+        </p:spPr>
+        <p:style>
+          <a:lnRef idx="2">
+            <a:schemeClr val="accent1">
+              <a:shade val="50000"/>
+            </a:schemeClr>
+          </a:lnRef>
+          <a:fillRef idx="1">
+            <a:schemeClr val="accent1"/>
+          </a:fillRef>
+          <a:effectRef idx="0">
+            <a:schemeClr val="accent1"/>
+          </a:effectRef>
+          <a:fontRef idx="minor">
+            <a:schemeClr val="lt1"/>
+          </a:fontRef>
+        </p:style>
+        <p:txBody>
+          <a:bodyPr rtlCol="0" anchor="ctr"/>
+          <a:lstStyle/>
+          <a:p>
+            <a:pPr algn="ctr"/>
+            <a:endParaRPr lang="en-US" sz="800" dirty="0">
+              <a:solidFill>
+                <a:schemeClr val="tx1"/>
+              </a:solidFill>
+            </a:endParaRPr>
+          </a:p>
+        </p:txBody>
+      </p:sp>
+      <p:sp>
+        <p:nvSpPr>
+          <p:cNvPr id="49" name="TextBox 48">
+            <a:extLst>
+              <a:ext uri="{FF2B5EF4-FFF2-40B4-BE49-F238E27FC236}">
+                <a16:creationId xmlns:a16="http://schemas.microsoft.com/office/drawing/2014/main" id="{46277917-EA4B-274F-A7F9-F946763D9E72}"/>
+              </a:ext>
+            </a:extLst>
+          </p:cNvPr>
+          <p:cNvSpPr txBox="1"/>
+          <p:nvPr/>
+        </p:nvSpPr>
+        <p:spPr>
+          <a:xfrm>
+            <a:off x="826327" y="1349730"/>
+            <a:ext cx="1136850" cy="202235"/>
+          </a:xfrm>
+          <a:prstGeom prst="rect">
+            <a:avLst/>
+          </a:prstGeom>
+          <a:noFill/>
+        </p:spPr>
+        <p:txBody>
+          <a:bodyPr wrap="none" rtlCol="0">
+            <a:spAutoFit/>
+          </a:bodyPr>
+          <a:lstStyle/>
+          <a:p>
+            <a:r>
+              <a:rPr lang="en-US" dirty="0"/>
+              <a:t>timestamp = 1584882663</a:t>
+            </a:r>
+          </a:p>
+        </p:txBody>
+      </p:sp>
+      <p:sp>
+        <p:nvSpPr>
+          <p:cNvPr id="50" name="TextBox 49">
+            <a:extLst>
+              <a:ext uri="{FF2B5EF4-FFF2-40B4-BE49-F238E27FC236}">
+                <a16:creationId xmlns:a16="http://schemas.microsoft.com/office/drawing/2014/main" id="{FB8E87C8-E443-2348-8F6A-302C138FB5AA}"/>
+              </a:ext>
+            </a:extLst>
+          </p:cNvPr>
+          <p:cNvSpPr txBox="1"/>
+          <p:nvPr/>
+        </p:nvSpPr>
+        <p:spPr>
+          <a:xfrm>
+            <a:off x="0" y="1234235"/>
+            <a:ext cx="974947" cy="422039"/>
+          </a:xfrm>
+          <a:prstGeom prst="rect">
+            <a:avLst/>
+          </a:prstGeom>
+          <a:noFill/>
+        </p:spPr>
+        <p:txBody>
+          <a:bodyPr wrap="none" rtlCol="0">
+            <a:spAutoFit/>
+          </a:bodyPr>
+          <a:lstStyle/>
+          <a:p>
+            <a:r>
+              <a:rPr lang="en-US" dirty="0"/>
+              <a:t>Message exchanged </a:t>
+            </a:r>
+          </a:p>
+          <a:p>
+            <a:r>
+              <a:rPr lang="en-US" dirty="0"/>
+              <a:t>during the execution </a:t>
+            </a:r>
+          </a:p>
+          <a:p>
+            <a:r>
+              <a:rPr lang="en-US" dirty="0"/>
+              <a:t>of Test 1</a:t>
+            </a:r>
+          </a:p>
+        </p:txBody>
+      </p:sp>
+      <p:sp>
+        <p:nvSpPr>
+          <p:cNvPr id="51" name="Rectangle 50">
+            <a:extLst>
+              <a:ext uri="{FF2B5EF4-FFF2-40B4-BE49-F238E27FC236}">
+                <a16:creationId xmlns:a16="http://schemas.microsoft.com/office/drawing/2014/main" id="{4C337B43-AAC9-814B-9078-E99FDCED44F8}"/>
+              </a:ext>
+            </a:extLst>
+          </p:cNvPr>
+          <p:cNvSpPr/>
+          <p:nvPr/>
+        </p:nvSpPr>
+        <p:spPr>
+          <a:xfrm>
+            <a:off x="898851" y="1193729"/>
+            <a:ext cx="956843" cy="200055"/>
+          </a:xfrm>
+          <a:prstGeom prst="rect">
+            <a:avLst/>
+          </a:prstGeom>
+        </p:spPr>
+        <p:txBody>
+          <a:bodyPr wrap="square">
+            <a:spAutoFit/>
+          </a:bodyPr>
+          <a:lstStyle/>
+          <a:p>
+            <a:r>
+              <a:rPr lang="en-US" sz="700" dirty="0">
+                <a:solidFill>
+                  <a:schemeClr val="tx1"/>
+                </a:solidFill>
+              </a:rPr>
+              <a:t>m1 : </a:t>
+            </a:r>
+            <a:r>
+              <a:rPr lang="en-US" sz="700" dirty="0" err="1">
+                <a:solidFill>
+                  <a:schemeClr val="tx1"/>
+                </a:solidFill>
+              </a:rPr>
+              <a:t>TimeMessage</a:t>
+            </a:r>
+            <a:endParaRPr lang="en-US" dirty="0"/>
+          </a:p>
+        </p:txBody>
+      </p:sp>
+      <p:sp>
+        <p:nvSpPr>
+          <p:cNvPr id="52" name="Rectangle 51">
+            <a:extLst>
+              <a:ext uri="{FF2B5EF4-FFF2-40B4-BE49-F238E27FC236}">
+                <a16:creationId xmlns:a16="http://schemas.microsoft.com/office/drawing/2014/main" id="{858C6F44-2158-CD4E-AD4F-EE24FD9AC4A5}"/>
+              </a:ext>
+            </a:extLst>
+          </p:cNvPr>
+          <p:cNvSpPr/>
+          <p:nvPr/>
+        </p:nvSpPr>
+        <p:spPr>
+          <a:xfrm>
+            <a:off x="881000" y="1625324"/>
+            <a:ext cx="981417" cy="295233"/>
+          </a:xfrm>
+          <a:prstGeom prst="rect">
+            <a:avLst/>
+          </a:prstGeom>
+          <a:noFill/>
+          <a:ln>
+            <a:solidFill>
+              <a:schemeClr val="tx1"/>
+            </a:solidFill>
+          </a:ln>
+        </p:spPr>
+        <p:style>
+          <a:lnRef idx="2">
+            <a:schemeClr val="accent1">
+              <a:shade val="50000"/>
+            </a:schemeClr>
+          </a:lnRef>
+          <a:fillRef idx="1">
+            <a:schemeClr val="accent1"/>
+          </a:fillRef>
+          <a:effectRef idx="0">
+            <a:schemeClr val="accent1"/>
+          </a:effectRef>
+          <a:fontRef idx="minor">
+            <a:schemeClr val="lt1"/>
+          </a:fontRef>
+        </p:style>
+        <p:txBody>
+          <a:bodyPr rtlCol="0" anchor="ctr"/>
+          <a:lstStyle/>
+          <a:p>
+            <a:pPr algn="ctr"/>
+            <a:endParaRPr lang="en-US"/>
+          </a:p>
+        </p:txBody>
+      </p:sp>
+      <p:sp>
+        <p:nvSpPr>
+          <p:cNvPr id="53" name="Rectangle 52">
+            <a:extLst>
+              <a:ext uri="{FF2B5EF4-FFF2-40B4-BE49-F238E27FC236}">
+                <a16:creationId xmlns:a16="http://schemas.microsoft.com/office/drawing/2014/main" id="{2E4EB9C1-5F2C-D949-BF93-EE4B7240CEC1}"/>
+              </a:ext>
+            </a:extLst>
+          </p:cNvPr>
+          <p:cNvSpPr/>
+          <p:nvPr/>
+        </p:nvSpPr>
+        <p:spPr>
+          <a:xfrm>
+            <a:off x="881684" y="1626007"/>
+            <a:ext cx="980733" cy="128834"/>
+          </a:xfrm>
+          <a:prstGeom prst="rect">
+            <a:avLst/>
+          </a:prstGeom>
+          <a:noFill/>
+          <a:ln>
+            <a:solidFill>
+              <a:schemeClr val="tx1"/>
+            </a:solidFill>
+          </a:ln>
+        </p:spPr>
+        <p:style>
+          <a:lnRef idx="2">
+            <a:schemeClr val="accent1">
+              <a:shade val="50000"/>
+            </a:schemeClr>
+          </a:lnRef>
+          <a:fillRef idx="1">
+            <a:schemeClr val="accent1"/>
+          </a:fillRef>
+          <a:effectRef idx="0">
+            <a:schemeClr val="accent1"/>
+          </a:effectRef>
+          <a:fontRef idx="minor">
+            <a:schemeClr val="lt1"/>
+          </a:fontRef>
+        </p:style>
+        <p:txBody>
+          <a:bodyPr rtlCol="0" anchor="ctr"/>
+          <a:lstStyle/>
+          <a:p>
+            <a:pPr algn="ctr"/>
+            <a:endParaRPr lang="en-US" sz="800" dirty="0">
+              <a:solidFill>
+                <a:schemeClr val="tx1"/>
+              </a:solidFill>
+            </a:endParaRPr>
+          </a:p>
+        </p:txBody>
+      </p:sp>
+      <p:sp>
+        <p:nvSpPr>
+          <p:cNvPr id="54" name="TextBox 53">
+            <a:extLst>
+              <a:ext uri="{FF2B5EF4-FFF2-40B4-BE49-F238E27FC236}">
+                <a16:creationId xmlns:a16="http://schemas.microsoft.com/office/drawing/2014/main" id="{C95CD4B2-F699-ED4E-8428-B68E3FCCF32A}"/>
+              </a:ext>
+            </a:extLst>
+          </p:cNvPr>
+          <p:cNvSpPr txBox="1"/>
+          <p:nvPr/>
+        </p:nvSpPr>
+        <p:spPr>
+          <a:xfrm>
+            <a:off x="822910" y="1747653"/>
+            <a:ext cx="870751" cy="170816"/>
+          </a:xfrm>
+          <a:prstGeom prst="rect">
+            <a:avLst/>
+          </a:prstGeom>
+          <a:noFill/>
+        </p:spPr>
+        <p:txBody>
+          <a:bodyPr wrap="none" rtlCol="0">
+            <a:spAutoFit/>
+          </a:bodyPr>
+          <a:lstStyle/>
+          <a:p>
+            <a:r>
+              <a:rPr lang="en-US" dirty="0"/>
+              <a:t>timestamp = 1584889773</a:t>
+            </a:r>
+          </a:p>
+        </p:txBody>
+      </p:sp>
+      <p:sp>
+        <p:nvSpPr>
+          <p:cNvPr id="55" name="Rectangle 54">
+            <a:extLst>
+              <a:ext uri="{FF2B5EF4-FFF2-40B4-BE49-F238E27FC236}">
+                <a16:creationId xmlns:a16="http://schemas.microsoft.com/office/drawing/2014/main" id="{F92B5FB1-43BA-9B4D-B569-3A0AD69F38FA}"/>
+              </a:ext>
+            </a:extLst>
+          </p:cNvPr>
+          <p:cNvSpPr/>
+          <p:nvPr/>
+        </p:nvSpPr>
+        <p:spPr>
+          <a:xfrm>
+            <a:off x="895434" y="1591652"/>
+            <a:ext cx="870751" cy="200055"/>
+          </a:xfrm>
+          <a:prstGeom prst="rect">
+            <a:avLst/>
+          </a:prstGeom>
+        </p:spPr>
+        <p:txBody>
+          <a:bodyPr wrap="none">
+            <a:spAutoFit/>
+          </a:bodyPr>
+          <a:lstStyle/>
+          <a:p>
+            <a:r>
+              <a:rPr lang="en-US" sz="700" dirty="0">
+                <a:solidFill>
+                  <a:schemeClr val="tx1"/>
+                </a:solidFill>
+              </a:rPr>
+              <a:t>m1 : </a:t>
+            </a:r>
+            <a:r>
+              <a:rPr lang="en-US" sz="700" dirty="0" err="1">
+                <a:solidFill>
+                  <a:schemeClr val="tx1"/>
+                </a:solidFill>
+              </a:rPr>
+              <a:t>TimeMessage</a:t>
+            </a:r>
+            <a:endParaRPr lang="en-US" dirty="0"/>
+          </a:p>
+        </p:txBody>
+      </p:sp>
+      <p:sp>
+        <p:nvSpPr>
+          <p:cNvPr id="56" name="TextBox 55">
+            <a:extLst>
+              <a:ext uri="{FF2B5EF4-FFF2-40B4-BE49-F238E27FC236}">
+                <a16:creationId xmlns:a16="http://schemas.microsoft.com/office/drawing/2014/main" id="{C12EB353-8277-D344-A7DE-8ECEEF3E4E1B}"/>
+              </a:ext>
+            </a:extLst>
+          </p:cNvPr>
+          <p:cNvSpPr txBox="1"/>
+          <p:nvPr/>
+        </p:nvSpPr>
+        <p:spPr>
+          <a:xfrm>
+            <a:off x="0" y="1644459"/>
+            <a:ext cx="974947" cy="422039"/>
+          </a:xfrm>
+          <a:prstGeom prst="rect">
+            <a:avLst/>
+          </a:prstGeom>
+          <a:noFill/>
+        </p:spPr>
+        <p:txBody>
+          <a:bodyPr wrap="none" rtlCol="0">
+            <a:spAutoFit/>
+          </a:bodyPr>
+          <a:lstStyle/>
+          <a:p>
+            <a:r>
+              <a:rPr lang="en-US" dirty="0"/>
+              <a:t>Message exchanged </a:t>
+            </a:r>
+          </a:p>
+          <a:p>
+            <a:r>
+              <a:rPr lang="en-US" dirty="0"/>
+              <a:t>during the execution </a:t>
+            </a:r>
+          </a:p>
+          <a:p>
+            <a:r>
+              <a:rPr lang="en-US" dirty="0"/>
+              <a:t>of Test 2</a:t>
+            </a:r>
+          </a:p>
+        </p:txBody>
+      </p:sp>
+      <p:sp>
+        <p:nvSpPr>
+          <p:cNvPr id="60" name="TextBox 59">
+            <a:extLst>
+              <a:ext uri="{FF2B5EF4-FFF2-40B4-BE49-F238E27FC236}">
+                <a16:creationId xmlns:a16="http://schemas.microsoft.com/office/drawing/2014/main" id="{125A377C-48D3-6044-BB48-500D9626A729}"/>
+              </a:ext>
+            </a:extLst>
+          </p:cNvPr>
+          <p:cNvSpPr txBox="1"/>
+          <p:nvPr/>
+        </p:nvSpPr>
+        <p:spPr>
+          <a:xfrm>
+            <a:off x="1946309" y="1190174"/>
+            <a:ext cx="984565" cy="422039"/>
+          </a:xfrm>
+          <a:prstGeom prst="rect">
+            <a:avLst/>
+          </a:prstGeom>
+          <a:noFill/>
+        </p:spPr>
+        <p:txBody>
+          <a:bodyPr wrap="none" rtlCol="0">
+            <a:spAutoFit/>
+          </a:bodyPr>
+          <a:lstStyle/>
+          <a:p>
+            <a:r>
+              <a:rPr lang="en-US" dirty="0"/>
+              <a:t>Example of message </a:t>
+            </a:r>
+          </a:p>
+          <a:p>
+            <a:r>
+              <a:rPr lang="en-US" dirty="0"/>
+              <a:t>exchanged in Test 1 </a:t>
+            </a:r>
+          </a:p>
+          <a:p>
+            <a:r>
+              <a:rPr lang="en-US" dirty="0"/>
+              <a:t>after bit flip mutation</a:t>
+            </a:r>
+          </a:p>
+        </p:txBody>
+      </p:sp>
+      <p:sp>
+        <p:nvSpPr>
+          <p:cNvPr id="65" name="TextBox 64">
+            <a:extLst>
+              <a:ext uri="{FF2B5EF4-FFF2-40B4-BE49-F238E27FC236}">
+                <a16:creationId xmlns:a16="http://schemas.microsoft.com/office/drawing/2014/main" id="{A6E5DEB0-E152-E346-87AB-E85013325834}"/>
+              </a:ext>
+            </a:extLst>
+          </p:cNvPr>
+          <p:cNvSpPr txBox="1"/>
+          <p:nvPr/>
+        </p:nvSpPr>
+        <p:spPr>
+          <a:xfrm>
+            <a:off x="1950791" y="1577898"/>
+            <a:ext cx="984565" cy="422039"/>
+          </a:xfrm>
+          <a:prstGeom prst="rect">
+            <a:avLst/>
+          </a:prstGeom>
+          <a:noFill/>
+        </p:spPr>
+        <p:txBody>
+          <a:bodyPr wrap="none" rtlCol="0">
+            <a:spAutoFit/>
+          </a:bodyPr>
+          <a:lstStyle/>
+          <a:p>
+            <a:r>
+              <a:rPr lang="en-US" dirty="0"/>
+              <a:t>Example of message </a:t>
+            </a:r>
+          </a:p>
+          <a:p>
+            <a:r>
+              <a:rPr lang="en-US" dirty="0"/>
+              <a:t>exchanged in Test 2 </a:t>
+            </a:r>
+          </a:p>
+          <a:p>
+            <a:r>
+              <a:rPr lang="en-US" dirty="0"/>
+              <a:t>after bit flip mutation</a:t>
+            </a:r>
+          </a:p>
+        </p:txBody>
+      </p:sp>
+      <p:sp>
+        <p:nvSpPr>
+          <p:cNvPr id="67" name="Rectangle 66">
+            <a:extLst>
+              <a:ext uri="{FF2B5EF4-FFF2-40B4-BE49-F238E27FC236}">
+                <a16:creationId xmlns:a16="http://schemas.microsoft.com/office/drawing/2014/main" id="{48967297-F324-7744-B040-EBAFC7F90603}"/>
+              </a:ext>
+            </a:extLst>
+          </p:cNvPr>
+          <p:cNvSpPr/>
+          <p:nvPr/>
+        </p:nvSpPr>
+        <p:spPr>
+          <a:xfrm>
+            <a:off x="3067637" y="1230945"/>
+            <a:ext cx="978000" cy="295233"/>
+          </a:xfrm>
+          <a:prstGeom prst="rect">
+            <a:avLst/>
+          </a:prstGeom>
+          <a:noFill/>
+          <a:ln>
+            <a:solidFill>
+              <a:schemeClr val="tx1"/>
+            </a:solidFill>
+          </a:ln>
+        </p:spPr>
+        <p:style>
+          <a:lnRef idx="2">
+            <a:schemeClr val="accent1">
+              <a:shade val="50000"/>
+            </a:schemeClr>
+          </a:lnRef>
+          <a:fillRef idx="1">
+            <a:schemeClr val="accent1"/>
+          </a:fillRef>
+          <a:effectRef idx="0">
+            <a:schemeClr val="accent1"/>
+          </a:effectRef>
+          <a:fontRef idx="minor">
+            <a:schemeClr val="lt1"/>
+          </a:fontRef>
+        </p:style>
+        <p:txBody>
+          <a:bodyPr rtlCol="0" anchor="ctr"/>
+          <a:lstStyle/>
+          <a:p>
+            <a:pPr algn="ctr"/>
+            <a:endParaRPr lang="en-US"/>
+          </a:p>
+        </p:txBody>
+      </p:sp>
+      <p:sp>
+        <p:nvSpPr>
+          <p:cNvPr id="68" name="Rectangle 67">
+            <a:extLst>
+              <a:ext uri="{FF2B5EF4-FFF2-40B4-BE49-F238E27FC236}">
+                <a16:creationId xmlns:a16="http://schemas.microsoft.com/office/drawing/2014/main" id="{EA718CE3-6966-B344-B079-FDE6205926EB}"/>
+              </a:ext>
+            </a:extLst>
+          </p:cNvPr>
+          <p:cNvSpPr/>
+          <p:nvPr/>
+        </p:nvSpPr>
+        <p:spPr>
+          <a:xfrm>
+            <a:off x="3068321" y="1231628"/>
+            <a:ext cx="977316" cy="136792"/>
+          </a:xfrm>
+          <a:prstGeom prst="rect">
+            <a:avLst/>
+          </a:prstGeom>
+          <a:noFill/>
+          <a:ln>
+            <a:solidFill>
+              <a:schemeClr val="tx1"/>
+            </a:solidFill>
+          </a:ln>
+        </p:spPr>
+        <p:style>
+          <a:lnRef idx="2">
+            <a:schemeClr val="accent1">
+              <a:shade val="50000"/>
+            </a:schemeClr>
+          </a:lnRef>
+          <a:fillRef idx="1">
+            <a:schemeClr val="accent1"/>
+          </a:fillRef>
+          <a:effectRef idx="0">
+            <a:schemeClr val="accent1"/>
+          </a:effectRef>
+          <a:fontRef idx="minor">
+            <a:schemeClr val="lt1"/>
+          </a:fontRef>
+        </p:style>
+        <p:txBody>
+          <a:bodyPr rtlCol="0" anchor="ctr"/>
+          <a:lstStyle/>
+          <a:p>
+            <a:pPr algn="ctr"/>
+            <a:endParaRPr lang="en-US" sz="800" dirty="0">
+              <a:solidFill>
+                <a:schemeClr val="tx1"/>
+              </a:solidFill>
+            </a:endParaRPr>
+          </a:p>
+        </p:txBody>
+      </p:sp>
+      <p:sp>
+        <p:nvSpPr>
+          <p:cNvPr id="69" name="TextBox 68">
+            <a:extLst>
+              <a:ext uri="{FF2B5EF4-FFF2-40B4-BE49-F238E27FC236}">
+                <a16:creationId xmlns:a16="http://schemas.microsoft.com/office/drawing/2014/main" id="{22D2FCAB-F064-3F4C-966F-634C23121776}"/>
+              </a:ext>
+            </a:extLst>
+          </p:cNvPr>
+          <p:cNvSpPr txBox="1"/>
+          <p:nvPr/>
+        </p:nvSpPr>
+        <p:spPr>
+          <a:xfrm>
+            <a:off x="3009546" y="1353274"/>
+            <a:ext cx="718466" cy="202235"/>
+          </a:xfrm>
+          <a:prstGeom prst="rect">
+            <a:avLst/>
+          </a:prstGeom>
+          <a:noFill/>
+        </p:spPr>
+        <p:txBody>
+          <a:bodyPr wrap="none" rtlCol="0">
+            <a:spAutoFit/>
+          </a:bodyPr>
+          <a:lstStyle/>
+          <a:p>
+            <a:r>
+              <a:rPr lang="en-US" dirty="0"/>
+              <a:t>timestamp = 0</a:t>
+            </a:r>
+          </a:p>
+        </p:txBody>
+      </p:sp>
+      <p:sp>
+        <p:nvSpPr>
+          <p:cNvPr id="70" name="Rectangle 69">
+            <a:extLst>
+              <a:ext uri="{FF2B5EF4-FFF2-40B4-BE49-F238E27FC236}">
+                <a16:creationId xmlns:a16="http://schemas.microsoft.com/office/drawing/2014/main" id="{0C6AF70E-20DC-6346-B229-0E2FC711393D}"/>
+              </a:ext>
+            </a:extLst>
+          </p:cNvPr>
+          <p:cNvSpPr/>
+          <p:nvPr/>
+        </p:nvSpPr>
+        <p:spPr>
+          <a:xfrm>
+            <a:off x="3082070" y="1197273"/>
+            <a:ext cx="956843" cy="200055"/>
+          </a:xfrm>
+          <a:prstGeom prst="rect">
+            <a:avLst/>
+          </a:prstGeom>
+        </p:spPr>
+        <p:txBody>
+          <a:bodyPr wrap="square">
+            <a:spAutoFit/>
+          </a:bodyPr>
+          <a:lstStyle/>
+          <a:p>
+            <a:r>
+              <a:rPr lang="en-US" sz="700" dirty="0">
+                <a:solidFill>
+                  <a:schemeClr val="tx1"/>
+                </a:solidFill>
+              </a:rPr>
+              <a:t>m1 : </a:t>
+            </a:r>
+            <a:r>
+              <a:rPr lang="en-US" sz="700" dirty="0" err="1">
+                <a:solidFill>
+                  <a:schemeClr val="tx1"/>
+                </a:solidFill>
+              </a:rPr>
+              <a:t>TimeMessage</a:t>
+            </a:r>
+            <a:endParaRPr lang="en-US" dirty="0"/>
+          </a:p>
+        </p:txBody>
+      </p:sp>
+      <p:sp>
+        <p:nvSpPr>
+          <p:cNvPr id="71" name="Rectangle 70">
+            <a:extLst>
+              <a:ext uri="{FF2B5EF4-FFF2-40B4-BE49-F238E27FC236}">
+                <a16:creationId xmlns:a16="http://schemas.microsoft.com/office/drawing/2014/main" id="{9BC25493-12E3-2849-A6A3-0736C0E368DC}"/>
+              </a:ext>
+            </a:extLst>
+          </p:cNvPr>
+          <p:cNvSpPr/>
+          <p:nvPr/>
+        </p:nvSpPr>
+        <p:spPr>
+          <a:xfrm>
+            <a:off x="3064219" y="1628868"/>
+            <a:ext cx="981417" cy="295233"/>
+          </a:xfrm>
+          <a:prstGeom prst="rect">
+            <a:avLst/>
+          </a:prstGeom>
+          <a:noFill/>
+          <a:ln>
+            <a:solidFill>
+              <a:schemeClr val="tx1"/>
+            </a:solidFill>
+          </a:ln>
+        </p:spPr>
+        <p:style>
+          <a:lnRef idx="2">
+            <a:schemeClr val="accent1">
+              <a:shade val="50000"/>
+            </a:schemeClr>
+          </a:lnRef>
+          <a:fillRef idx="1">
+            <a:schemeClr val="accent1"/>
+          </a:fillRef>
+          <a:effectRef idx="0">
+            <a:schemeClr val="accent1"/>
+          </a:effectRef>
+          <a:fontRef idx="minor">
+            <a:schemeClr val="lt1"/>
+          </a:fontRef>
+        </p:style>
+        <p:txBody>
+          <a:bodyPr rtlCol="0" anchor="ctr"/>
+          <a:lstStyle/>
+          <a:p>
+            <a:pPr algn="ctr"/>
+            <a:endParaRPr lang="en-US"/>
+          </a:p>
+        </p:txBody>
+      </p:sp>
+      <p:sp>
+        <p:nvSpPr>
+          <p:cNvPr id="72" name="Rectangle 71">
+            <a:extLst>
+              <a:ext uri="{FF2B5EF4-FFF2-40B4-BE49-F238E27FC236}">
+                <a16:creationId xmlns:a16="http://schemas.microsoft.com/office/drawing/2014/main" id="{8662B564-747B-E04D-95B1-3591A8815302}"/>
+              </a:ext>
+            </a:extLst>
+          </p:cNvPr>
+          <p:cNvSpPr/>
+          <p:nvPr/>
+        </p:nvSpPr>
+        <p:spPr>
+          <a:xfrm>
+            <a:off x="3064903" y="1629551"/>
+            <a:ext cx="980733" cy="128834"/>
+          </a:xfrm>
+          <a:prstGeom prst="rect">
+            <a:avLst/>
+          </a:prstGeom>
+          <a:noFill/>
+          <a:ln>
+            <a:solidFill>
+              <a:schemeClr val="tx1"/>
+            </a:solidFill>
+          </a:ln>
+        </p:spPr>
+        <p:style>
+          <a:lnRef idx="2">
+            <a:schemeClr val="accent1">
+              <a:shade val="50000"/>
+            </a:schemeClr>
+          </a:lnRef>
+          <a:fillRef idx="1">
+            <a:schemeClr val="accent1"/>
+          </a:fillRef>
+          <a:effectRef idx="0">
+            <a:schemeClr val="accent1"/>
+          </a:effectRef>
+          <a:fontRef idx="minor">
+            <a:schemeClr val="lt1"/>
+          </a:fontRef>
+        </p:style>
+        <p:txBody>
+          <a:bodyPr rtlCol="0" anchor="ctr"/>
+          <a:lstStyle/>
+          <a:p>
+            <a:pPr algn="ctr"/>
+            <a:endParaRPr lang="en-US" sz="800" dirty="0">
+              <a:solidFill>
+                <a:schemeClr val="tx1"/>
+              </a:solidFill>
+            </a:endParaRPr>
+          </a:p>
+        </p:txBody>
+      </p:sp>
+      <p:sp>
+        <p:nvSpPr>
+          <p:cNvPr id="73" name="TextBox 72">
+            <a:extLst>
+              <a:ext uri="{FF2B5EF4-FFF2-40B4-BE49-F238E27FC236}">
+                <a16:creationId xmlns:a16="http://schemas.microsoft.com/office/drawing/2014/main" id="{F1786E23-E218-564B-AEC6-0987114ABB28}"/>
+              </a:ext>
+            </a:extLst>
+          </p:cNvPr>
+          <p:cNvSpPr txBox="1"/>
+          <p:nvPr/>
+        </p:nvSpPr>
+        <p:spPr>
+          <a:xfrm>
+            <a:off x="3006129" y="1751197"/>
+            <a:ext cx="1136850" cy="202235"/>
+          </a:xfrm>
+          <a:prstGeom prst="rect">
+            <a:avLst/>
+          </a:prstGeom>
+          <a:noFill/>
+        </p:spPr>
+        <p:txBody>
+          <a:bodyPr wrap="none" rtlCol="0">
+            <a:spAutoFit/>
+          </a:bodyPr>
+          <a:lstStyle/>
+          <a:p>
+            <a:r>
+              <a:rPr lang="en-US" dirty="0"/>
+              <a:t>timestamp = 9999999999</a:t>
+            </a:r>
+          </a:p>
+        </p:txBody>
+      </p:sp>
+      <p:sp>
+        <p:nvSpPr>
+          <p:cNvPr id="74" name="Rectangle 73">
+            <a:extLst>
+              <a:ext uri="{FF2B5EF4-FFF2-40B4-BE49-F238E27FC236}">
+                <a16:creationId xmlns:a16="http://schemas.microsoft.com/office/drawing/2014/main" id="{C66E9557-F9DF-B741-93FF-749270A81B7B}"/>
+              </a:ext>
+            </a:extLst>
+          </p:cNvPr>
+          <p:cNvSpPr/>
+          <p:nvPr/>
+        </p:nvSpPr>
+        <p:spPr>
+          <a:xfrm>
+            <a:off x="3078653" y="1595196"/>
+            <a:ext cx="870751" cy="200055"/>
+          </a:xfrm>
+          <a:prstGeom prst="rect">
+            <a:avLst/>
+          </a:prstGeom>
+        </p:spPr>
+        <p:txBody>
+          <a:bodyPr wrap="none">
+            <a:spAutoFit/>
+          </a:bodyPr>
+          <a:lstStyle/>
+          <a:p>
+            <a:r>
+              <a:rPr lang="en-US" sz="700" dirty="0">
+                <a:solidFill>
+                  <a:schemeClr val="tx1"/>
+                </a:solidFill>
+              </a:rPr>
+              <a:t>m1 : </a:t>
+            </a:r>
+            <a:r>
+              <a:rPr lang="en-US" sz="700" dirty="0" err="1">
+                <a:solidFill>
+                  <a:schemeClr val="tx1"/>
+                </a:solidFill>
+              </a:rPr>
+              <a:t>TimeMessage</a:t>
+            </a:r>
+            <a:endParaRPr lang="en-US" dirty="0"/>
+          </a:p>
+        </p:txBody>
+      </p:sp>
+      <p:sp>
+        <p:nvSpPr>
+          <p:cNvPr id="75" name="TextBox 74">
+            <a:extLst>
+              <a:ext uri="{FF2B5EF4-FFF2-40B4-BE49-F238E27FC236}">
+                <a16:creationId xmlns:a16="http://schemas.microsoft.com/office/drawing/2014/main" id="{F34177B7-1C00-4C40-9D7B-A5B9337D9530}"/>
+              </a:ext>
+            </a:extLst>
+          </p:cNvPr>
+          <p:cNvSpPr txBox="1"/>
+          <p:nvPr/>
+        </p:nvSpPr>
+        <p:spPr>
+          <a:xfrm>
+            <a:off x="4416110" y="1283731"/>
+            <a:ext cx="628698" cy="202235"/>
+          </a:xfrm>
+          <a:prstGeom prst="rect">
+            <a:avLst/>
+          </a:prstGeom>
+          <a:noFill/>
+        </p:spPr>
+        <p:txBody>
+          <a:bodyPr wrap="none" rtlCol="0">
+            <a:spAutoFit/>
+          </a:bodyPr>
+          <a:lstStyle/>
+          <a:p>
+            <a:r>
+              <a:rPr lang="en-US" dirty="0"/>
+              <a:t>Test 1 : FAIL</a:t>
+            </a:r>
+          </a:p>
+        </p:txBody>
+      </p:sp>
+      <p:sp>
+        <p:nvSpPr>
+          <p:cNvPr id="76" name="TextBox 75">
+            <a:extLst>
+              <a:ext uri="{FF2B5EF4-FFF2-40B4-BE49-F238E27FC236}">
+                <a16:creationId xmlns:a16="http://schemas.microsoft.com/office/drawing/2014/main" id="{622B066F-8630-8149-86FE-ED170A518A0F}"/>
+              </a:ext>
+            </a:extLst>
+          </p:cNvPr>
+          <p:cNvSpPr txBox="1"/>
+          <p:nvPr/>
+        </p:nvSpPr>
+        <p:spPr>
+          <a:xfrm>
+            <a:off x="4419655" y="1691313"/>
+            <a:ext cx="628698" cy="202235"/>
+          </a:xfrm>
+          <a:prstGeom prst="rect">
+            <a:avLst/>
+          </a:prstGeom>
+          <a:noFill/>
+        </p:spPr>
+        <p:txBody>
+          <a:bodyPr wrap="none" rtlCol="0">
+            <a:spAutoFit/>
+          </a:bodyPr>
+          <a:lstStyle/>
+          <a:p>
+            <a:r>
+              <a:rPr lang="en-US" dirty="0"/>
+              <a:t>Test 2 : FAIL</a:t>
+            </a:r>
+          </a:p>
+        </p:txBody>
+      </p:sp>
+      <p:sp>
+        <p:nvSpPr>
+          <p:cNvPr id="77" name="TextBox 76">
+            <a:extLst>
+              <a:ext uri="{FF2B5EF4-FFF2-40B4-BE49-F238E27FC236}">
+                <a16:creationId xmlns:a16="http://schemas.microsoft.com/office/drawing/2014/main" id="{8D1507D0-7A39-3849-99F7-59BADBC3131A}"/>
+              </a:ext>
+            </a:extLst>
+          </p:cNvPr>
+          <p:cNvSpPr txBox="1"/>
+          <p:nvPr/>
+        </p:nvSpPr>
+        <p:spPr>
+          <a:xfrm>
+            <a:off x="4440919" y="989564"/>
+            <a:ext cx="617477" cy="202235"/>
+          </a:xfrm>
+          <a:prstGeom prst="rect">
+            <a:avLst/>
+          </a:prstGeom>
+          <a:noFill/>
+        </p:spPr>
+        <p:txBody>
+          <a:bodyPr wrap="none" rtlCol="0">
+            <a:spAutoFit/>
+          </a:bodyPr>
+          <a:lstStyle/>
+          <a:p>
+            <a:r>
+              <a:rPr lang="en-US" i="1" dirty="0"/>
+              <a:t>Test verdict</a:t>
+            </a:r>
+          </a:p>
+        </p:txBody>
+      </p:sp>
+      <p:sp>
+        <p:nvSpPr>
+          <p:cNvPr id="78" name="TextBox 77">
+            <a:extLst>
+              <a:ext uri="{FF2B5EF4-FFF2-40B4-BE49-F238E27FC236}">
+                <a16:creationId xmlns:a16="http://schemas.microsoft.com/office/drawing/2014/main" id="{9DCC5AD2-3AE0-264E-8C6B-CA788F0EE39A}"/>
+              </a:ext>
+            </a:extLst>
+          </p:cNvPr>
+          <p:cNvSpPr txBox="1"/>
+          <p:nvPr/>
+        </p:nvSpPr>
+        <p:spPr>
+          <a:xfrm>
+            <a:off x="1566530" y="0"/>
+            <a:ext cx="614271" cy="202235"/>
+          </a:xfrm>
+          <a:prstGeom prst="rect">
+            <a:avLst/>
+          </a:prstGeom>
+          <a:noFill/>
+        </p:spPr>
+        <p:txBody>
+          <a:bodyPr wrap="none" rtlCol="0">
+            <a:spAutoFit/>
+          </a:bodyPr>
+          <a:lstStyle/>
+          <a:p>
+            <a:r>
+              <a:rPr lang="en-US" i="1" dirty="0"/>
+              <a:t>Data model</a:t>
+            </a:r>
+          </a:p>
+        </p:txBody>
+      </p:sp>
+    </p:spTree>
+    <p:extLst>
+      <p:ext uri="{BB962C8B-B14F-4D97-AF65-F5344CB8AC3E}">
+        <p14:creationId xmlns:p14="http://schemas.microsoft.com/office/powerpoint/2010/main" val="2729779519"/>
+      </p:ext>
+    </p:extLst>
+  </p:cSld>
+  <p:clrMapOvr>
+    <a:masterClrMapping/>
+  </p:clrMapOvr>
+</p:sld>
+</file>
+
 <file path=ppt/theme/theme1.xml><?xml version="1.0" encoding="utf-8"?>
 <a:theme xmlns:a="http://schemas.openxmlformats.org/drawingml/2006/main" name="Office Theme">
   <a:themeElements>

</xml_diff>